<commit_message>
icone plancton affiche direction du courant
+ essai de ignore de bin/
+problème de pull depuis HP Probook
</commit_message>
<xml_diff>
--- a/icons/20240723-iconesPNMC.pptx
+++ b/icons/20240723-iconesPNMC.pptx
@@ -6,6 +6,7 @@
   </p:sldMasterIdLst>
   <p:sldIdLst>
     <p:sldId id="256" r:id="rId2"/>
+    <p:sldId id="257" r:id="rId3"/>
   </p:sldIdLst>
   <p:sldSz cx="12192000" cy="6858000"/>
   <p:notesSz cx="6858000" cy="9144000"/>
@@ -104,6 +105,11 @@
       </a:defRPr>
     </a:lvl9pPr>
   </p:defaultTextStyle>
+  <p:extLst>
+    <p:ext uri="{EFAFB233-063F-42B5-8137-9DF3F51BA10A}">
+      <p15:sldGuideLst xmlns:p15="http://schemas.microsoft.com/office/powerpoint/2012/main"/>
+    </p:ext>
+  </p:extLst>
 </p:presentation>
 </file>
 
@@ -238,7 +244,7 @@
           <a:p>
             <a:fld id="{D69CC91C-3FCF-491C-901A-4654FCD0FDAC}" type="datetimeFigureOut">
               <a:rPr lang="fr-FR" smtClean="0"/>
-              <a:t>23/07/2024</a:t>
+              <a:t>14/11/2024</a:t>
             </a:fld>
             <a:endParaRPr lang="fr-FR"/>
           </a:p>
@@ -408,7 +414,7 @@
           <a:p>
             <a:fld id="{D69CC91C-3FCF-491C-901A-4654FCD0FDAC}" type="datetimeFigureOut">
               <a:rPr lang="fr-FR" smtClean="0"/>
-              <a:t>23/07/2024</a:t>
+              <a:t>14/11/2024</a:t>
             </a:fld>
             <a:endParaRPr lang="fr-FR"/>
           </a:p>
@@ -588,7 +594,7 @@
           <a:p>
             <a:fld id="{D69CC91C-3FCF-491C-901A-4654FCD0FDAC}" type="datetimeFigureOut">
               <a:rPr lang="fr-FR" smtClean="0"/>
-              <a:t>23/07/2024</a:t>
+              <a:t>14/11/2024</a:t>
             </a:fld>
             <a:endParaRPr lang="fr-FR"/>
           </a:p>
@@ -758,7 +764,7 @@
           <a:p>
             <a:fld id="{D69CC91C-3FCF-491C-901A-4654FCD0FDAC}" type="datetimeFigureOut">
               <a:rPr lang="fr-FR" smtClean="0"/>
-              <a:t>23/07/2024</a:t>
+              <a:t>14/11/2024</a:t>
             </a:fld>
             <a:endParaRPr lang="fr-FR"/>
           </a:p>
@@ -1004,7 +1010,7 @@
           <a:p>
             <a:fld id="{D69CC91C-3FCF-491C-901A-4654FCD0FDAC}" type="datetimeFigureOut">
               <a:rPr lang="fr-FR" smtClean="0"/>
-              <a:t>23/07/2024</a:t>
+              <a:t>14/11/2024</a:t>
             </a:fld>
             <a:endParaRPr lang="fr-FR"/>
           </a:p>
@@ -1236,7 +1242,7 @@
           <a:p>
             <a:fld id="{D69CC91C-3FCF-491C-901A-4654FCD0FDAC}" type="datetimeFigureOut">
               <a:rPr lang="fr-FR" smtClean="0"/>
-              <a:t>23/07/2024</a:t>
+              <a:t>14/11/2024</a:t>
             </a:fld>
             <a:endParaRPr lang="fr-FR"/>
           </a:p>
@@ -1603,7 +1609,7 @@
           <a:p>
             <a:fld id="{D69CC91C-3FCF-491C-901A-4654FCD0FDAC}" type="datetimeFigureOut">
               <a:rPr lang="fr-FR" smtClean="0"/>
-              <a:t>23/07/2024</a:t>
+              <a:t>14/11/2024</a:t>
             </a:fld>
             <a:endParaRPr lang="fr-FR"/>
           </a:p>
@@ -1721,7 +1727,7 @@
           <a:p>
             <a:fld id="{D69CC91C-3FCF-491C-901A-4654FCD0FDAC}" type="datetimeFigureOut">
               <a:rPr lang="fr-FR" smtClean="0"/>
-              <a:t>23/07/2024</a:t>
+              <a:t>14/11/2024</a:t>
             </a:fld>
             <a:endParaRPr lang="fr-FR"/>
           </a:p>
@@ -1816,7 +1822,7 @@
           <a:p>
             <a:fld id="{D69CC91C-3FCF-491C-901A-4654FCD0FDAC}" type="datetimeFigureOut">
               <a:rPr lang="fr-FR" smtClean="0"/>
-              <a:t>23/07/2024</a:t>
+              <a:t>14/11/2024</a:t>
             </a:fld>
             <a:endParaRPr lang="fr-FR"/>
           </a:p>
@@ -2093,7 +2099,7 @@
           <a:p>
             <a:fld id="{D69CC91C-3FCF-491C-901A-4654FCD0FDAC}" type="datetimeFigureOut">
               <a:rPr lang="fr-FR" smtClean="0"/>
-              <a:t>23/07/2024</a:t>
+              <a:t>14/11/2024</a:t>
             </a:fld>
             <a:endParaRPr lang="fr-FR"/>
           </a:p>
@@ -2346,7 +2352,7 @@
           <a:p>
             <a:fld id="{D69CC91C-3FCF-491C-901A-4654FCD0FDAC}" type="datetimeFigureOut">
               <a:rPr lang="fr-FR" smtClean="0"/>
-              <a:t>23/07/2024</a:t>
+              <a:t>14/11/2024</a:t>
             </a:fld>
             <a:endParaRPr lang="fr-FR"/>
           </a:p>
@@ -2559,7 +2565,7 @@
           <a:p>
             <a:fld id="{D69CC91C-3FCF-491C-901A-4654FCD0FDAC}" type="datetimeFigureOut">
               <a:rPr lang="fr-FR" smtClean="0"/>
-              <a:t>23/07/2024</a:t>
+              <a:t>14/11/2024</a:t>
             </a:fld>
             <a:endParaRPr lang="fr-FR"/>
           </a:p>
@@ -3035,6 +3041,404 @@
 </p:sld>
 </file>
 
+<file path=ppt/slides/slide2.xml><?xml version="1.0" encoding="utf-8"?>
+<p:sld xmlns:a="http://schemas.openxmlformats.org/drawingml/2006/main" xmlns:r="http://schemas.openxmlformats.org/officeDocument/2006/relationships" xmlns:p="http://schemas.openxmlformats.org/presentationml/2006/main">
+  <p:cSld>
+    <p:spTree>
+      <p:nvGrpSpPr>
+        <p:cNvPr id="1" name=""/>
+        <p:cNvGrpSpPr/>
+        <p:nvPr/>
+      </p:nvGrpSpPr>
+      <p:grpSpPr>
+        <a:xfrm>
+          <a:off x="0" y="0"/>
+          <a:ext cx="0" cy="0"/>
+          <a:chOff x="0" y="0"/>
+          <a:chExt cx="0" cy="0"/>
+        </a:xfrm>
+      </p:grpSpPr>
+      <p:sp>
+        <p:nvSpPr>
+          <p:cNvPr id="5" name="Flèche droite 4"/>
+          <p:cNvSpPr/>
+          <p:nvPr/>
+        </p:nvSpPr>
+        <p:spPr>
+          <a:xfrm>
+            <a:off x="2022829" y="1776491"/>
+            <a:ext cx="720000" cy="720000"/>
+          </a:xfrm>
+          <a:prstGeom prst="rightArrow">
+            <a:avLst>
+              <a:gd name="adj1" fmla="val 41181"/>
+              <a:gd name="adj2" fmla="val 50000"/>
+            </a:avLst>
+          </a:prstGeom>
+          <a:solidFill>
+            <a:srgbClr val="FE5D02"/>
+          </a:solidFill>
+        </p:spPr>
+        <p:style>
+          <a:lnRef idx="2">
+            <a:schemeClr val="accent1">
+              <a:shade val="50000"/>
+            </a:schemeClr>
+          </a:lnRef>
+          <a:fillRef idx="1">
+            <a:schemeClr val="accent1"/>
+          </a:fillRef>
+          <a:effectRef idx="0">
+            <a:schemeClr val="accent1"/>
+          </a:effectRef>
+          <a:fontRef idx="minor">
+            <a:schemeClr val="lt1"/>
+          </a:fontRef>
+        </p:style>
+        <p:txBody>
+          <a:bodyPr rtlCol="0" anchor="ctr"/>
+          <a:lstStyle/>
+          <a:p>
+            <a:pPr algn="ctr"/>
+            <a:endParaRPr lang="fr-FR"/>
+          </a:p>
+        </p:txBody>
+      </p:sp>
+      <p:sp>
+        <p:nvSpPr>
+          <p:cNvPr id="6" name="Flèche droite 5"/>
+          <p:cNvSpPr/>
+          <p:nvPr/>
+        </p:nvSpPr>
+        <p:spPr>
+          <a:xfrm rot="2700000">
+            <a:off x="2022829" y="2580596"/>
+            <a:ext cx="720000" cy="720000"/>
+          </a:xfrm>
+          <a:prstGeom prst="rightArrow">
+            <a:avLst>
+              <a:gd name="adj1" fmla="val 41181"/>
+              <a:gd name="adj2" fmla="val 50000"/>
+            </a:avLst>
+          </a:prstGeom>
+          <a:solidFill>
+            <a:srgbClr val="FE0000"/>
+          </a:solidFill>
+        </p:spPr>
+        <p:style>
+          <a:lnRef idx="2">
+            <a:schemeClr val="accent1">
+              <a:shade val="50000"/>
+            </a:schemeClr>
+          </a:lnRef>
+          <a:fillRef idx="1">
+            <a:schemeClr val="accent1"/>
+          </a:fillRef>
+          <a:effectRef idx="0">
+            <a:schemeClr val="accent1"/>
+          </a:effectRef>
+          <a:fontRef idx="minor">
+            <a:schemeClr val="lt1"/>
+          </a:fontRef>
+        </p:style>
+        <p:txBody>
+          <a:bodyPr rtlCol="0" anchor="ctr"/>
+          <a:lstStyle/>
+          <a:p>
+            <a:pPr algn="ctr"/>
+            <a:endParaRPr lang="fr-FR"/>
+          </a:p>
+        </p:txBody>
+      </p:sp>
+      <p:sp>
+        <p:nvSpPr>
+          <p:cNvPr id="7" name="Flèche droite 6"/>
+          <p:cNvSpPr/>
+          <p:nvPr/>
+        </p:nvSpPr>
+        <p:spPr>
+          <a:xfrm rot="5400000">
+            <a:off x="2022829" y="3384701"/>
+            <a:ext cx="720000" cy="720000"/>
+          </a:xfrm>
+          <a:prstGeom prst="rightArrow">
+            <a:avLst>
+              <a:gd name="adj1" fmla="val 41181"/>
+              <a:gd name="adj2" fmla="val 50000"/>
+            </a:avLst>
+          </a:prstGeom>
+          <a:solidFill>
+            <a:srgbClr val="61016F"/>
+          </a:solidFill>
+        </p:spPr>
+        <p:style>
+          <a:lnRef idx="2">
+            <a:schemeClr val="accent1">
+              <a:shade val="50000"/>
+            </a:schemeClr>
+          </a:lnRef>
+          <a:fillRef idx="1">
+            <a:schemeClr val="accent1"/>
+          </a:fillRef>
+          <a:effectRef idx="0">
+            <a:schemeClr val="accent1"/>
+          </a:effectRef>
+          <a:fontRef idx="minor">
+            <a:schemeClr val="lt1"/>
+          </a:fontRef>
+        </p:style>
+        <p:txBody>
+          <a:bodyPr rtlCol="0" anchor="ctr"/>
+          <a:lstStyle/>
+          <a:p>
+            <a:pPr algn="ctr"/>
+            <a:endParaRPr lang="fr-FR"/>
+          </a:p>
+        </p:txBody>
+      </p:sp>
+      <p:sp>
+        <p:nvSpPr>
+          <p:cNvPr id="8" name="Flèche droite 7"/>
+          <p:cNvSpPr/>
+          <p:nvPr/>
+        </p:nvSpPr>
+        <p:spPr>
+          <a:xfrm rot="8100000">
+            <a:off x="2022829" y="4188806"/>
+            <a:ext cx="720000" cy="720000"/>
+          </a:xfrm>
+          <a:prstGeom prst="rightArrow">
+            <a:avLst>
+              <a:gd name="adj1" fmla="val 41181"/>
+              <a:gd name="adj2" fmla="val 50000"/>
+            </a:avLst>
+          </a:prstGeom>
+          <a:solidFill>
+            <a:srgbClr val="0000FE"/>
+          </a:solidFill>
+        </p:spPr>
+        <p:style>
+          <a:lnRef idx="2">
+            <a:schemeClr val="accent1">
+              <a:shade val="50000"/>
+            </a:schemeClr>
+          </a:lnRef>
+          <a:fillRef idx="1">
+            <a:schemeClr val="accent1"/>
+          </a:fillRef>
+          <a:effectRef idx="0">
+            <a:schemeClr val="accent1"/>
+          </a:effectRef>
+          <a:fontRef idx="minor">
+            <a:schemeClr val="lt1"/>
+          </a:fontRef>
+        </p:style>
+        <p:txBody>
+          <a:bodyPr rtlCol="0" anchor="ctr"/>
+          <a:lstStyle/>
+          <a:p>
+            <a:pPr algn="ctr"/>
+            <a:endParaRPr lang="fr-FR"/>
+          </a:p>
+        </p:txBody>
+      </p:sp>
+      <p:sp>
+        <p:nvSpPr>
+          <p:cNvPr id="9" name="Flèche droite 8"/>
+          <p:cNvSpPr/>
+          <p:nvPr/>
+        </p:nvSpPr>
+        <p:spPr>
+          <a:xfrm rot="10800000">
+            <a:off x="2022830" y="4992911"/>
+            <a:ext cx="720000" cy="720000"/>
+          </a:xfrm>
+          <a:prstGeom prst="rightArrow">
+            <a:avLst>
+              <a:gd name="adj1" fmla="val 41181"/>
+              <a:gd name="adj2" fmla="val 50000"/>
+            </a:avLst>
+          </a:prstGeom>
+          <a:solidFill>
+            <a:srgbClr val="008290"/>
+          </a:solidFill>
+        </p:spPr>
+        <p:style>
+          <a:lnRef idx="2">
+            <a:schemeClr val="accent1">
+              <a:shade val="50000"/>
+            </a:schemeClr>
+          </a:lnRef>
+          <a:fillRef idx="1">
+            <a:schemeClr val="accent1"/>
+          </a:fillRef>
+          <a:effectRef idx="0">
+            <a:schemeClr val="accent1"/>
+          </a:effectRef>
+          <a:fontRef idx="minor">
+            <a:schemeClr val="lt1"/>
+          </a:fontRef>
+        </p:style>
+        <p:txBody>
+          <a:bodyPr rtlCol="0" anchor="ctr"/>
+          <a:lstStyle/>
+          <a:p>
+            <a:pPr algn="ctr"/>
+            <a:endParaRPr lang="fr-FR"/>
+          </a:p>
+        </p:txBody>
+      </p:sp>
+      <p:sp>
+        <p:nvSpPr>
+          <p:cNvPr id="10" name="Flèche droite 9"/>
+          <p:cNvSpPr/>
+          <p:nvPr/>
+        </p:nvSpPr>
+        <p:spPr>
+          <a:xfrm rot="13500000">
+            <a:off x="2022829" y="5797015"/>
+            <a:ext cx="720000" cy="720000"/>
+          </a:xfrm>
+          <a:prstGeom prst="rightArrow">
+            <a:avLst>
+              <a:gd name="adj1" fmla="val 41181"/>
+              <a:gd name="adj2" fmla="val 50000"/>
+            </a:avLst>
+          </a:prstGeom>
+          <a:solidFill>
+            <a:srgbClr val="02A204"/>
+          </a:solidFill>
+        </p:spPr>
+        <p:style>
+          <a:lnRef idx="2">
+            <a:schemeClr val="accent1">
+              <a:shade val="50000"/>
+            </a:schemeClr>
+          </a:lnRef>
+          <a:fillRef idx="1">
+            <a:schemeClr val="accent1"/>
+          </a:fillRef>
+          <a:effectRef idx="0">
+            <a:schemeClr val="accent1"/>
+          </a:effectRef>
+          <a:fontRef idx="minor">
+            <a:schemeClr val="lt1"/>
+          </a:fontRef>
+        </p:style>
+        <p:txBody>
+          <a:bodyPr rtlCol="0" anchor="ctr"/>
+          <a:lstStyle/>
+          <a:p>
+            <a:pPr algn="ctr"/>
+            <a:endParaRPr lang="fr-FR"/>
+          </a:p>
+        </p:txBody>
+      </p:sp>
+      <p:sp>
+        <p:nvSpPr>
+          <p:cNvPr id="11" name="Flèche droite 10"/>
+          <p:cNvSpPr/>
+          <p:nvPr/>
+        </p:nvSpPr>
+        <p:spPr>
+          <a:xfrm rot="-2700000">
+            <a:off x="2022829" y="972386"/>
+            <a:ext cx="720000" cy="720000"/>
+          </a:xfrm>
+          <a:prstGeom prst="rightArrow">
+            <a:avLst>
+              <a:gd name="adj1" fmla="val 41181"/>
+              <a:gd name="adj2" fmla="val 50000"/>
+            </a:avLst>
+          </a:prstGeom>
+          <a:solidFill>
+            <a:srgbClr val="FF9E01"/>
+          </a:solidFill>
+        </p:spPr>
+        <p:style>
+          <a:lnRef idx="2">
+            <a:schemeClr val="accent1">
+              <a:shade val="50000"/>
+            </a:schemeClr>
+          </a:lnRef>
+          <a:fillRef idx="1">
+            <a:schemeClr val="accent1"/>
+          </a:fillRef>
+          <a:effectRef idx="0">
+            <a:schemeClr val="accent1"/>
+          </a:effectRef>
+          <a:fontRef idx="minor">
+            <a:schemeClr val="lt1"/>
+          </a:fontRef>
+        </p:style>
+        <p:txBody>
+          <a:bodyPr rtlCol="0" anchor="ctr"/>
+          <a:lstStyle/>
+          <a:p>
+            <a:pPr algn="ctr"/>
+            <a:endParaRPr lang="fr-FR"/>
+          </a:p>
+        </p:txBody>
+      </p:sp>
+      <p:sp>
+        <p:nvSpPr>
+          <p:cNvPr id="12" name="Flèche droite 11"/>
+          <p:cNvSpPr/>
+          <p:nvPr/>
+        </p:nvSpPr>
+        <p:spPr>
+          <a:xfrm rot="16200000">
+            <a:off x="2022829" y="168281"/>
+            <a:ext cx="720000" cy="720000"/>
+          </a:xfrm>
+          <a:prstGeom prst="rightArrow">
+            <a:avLst>
+              <a:gd name="adj1" fmla="val 41181"/>
+              <a:gd name="adj2" fmla="val 50000"/>
+            </a:avLst>
+          </a:prstGeom>
+          <a:solidFill>
+            <a:srgbClr val="FFFF01"/>
+          </a:solidFill>
+        </p:spPr>
+        <p:style>
+          <a:lnRef idx="2">
+            <a:schemeClr val="accent1">
+              <a:shade val="50000"/>
+            </a:schemeClr>
+          </a:lnRef>
+          <a:fillRef idx="1">
+            <a:schemeClr val="accent1"/>
+          </a:fillRef>
+          <a:effectRef idx="0">
+            <a:schemeClr val="accent1"/>
+          </a:effectRef>
+          <a:fontRef idx="minor">
+            <a:schemeClr val="lt1"/>
+          </a:fontRef>
+        </p:style>
+        <p:txBody>
+          <a:bodyPr rtlCol="0" anchor="ctr"/>
+          <a:lstStyle/>
+          <a:p>
+            <a:pPr algn="ctr"/>
+            <a:endParaRPr lang="fr-FR"/>
+          </a:p>
+        </p:txBody>
+      </p:sp>
+    </p:spTree>
+    <p:extLst>
+      <p:ext uri="{BB962C8B-B14F-4D97-AF65-F5344CB8AC3E}">
+        <p14:creationId xmlns:p14="http://schemas.microsoft.com/office/powerpoint/2010/main" val="1966525652"/>
+      </p:ext>
+    </p:extLst>
+  </p:cSld>
+  <p:clrMapOvr>
+    <a:masterClrMapping/>
+  </p:clrMapOvr>
+</p:sld>
+</file>
+
 <file path=ppt/theme/theme1.xml><?xml version="1.0" encoding="utf-8"?>
 <a:theme xmlns:a="http://schemas.openxmlformats.org/drawingml/2006/main" name="Thème Office">
   <a:themeElements>

</xml_diff>

<commit_message>
Visualisation des courants de surface
- création de C_StreamCurrent associé à C_MarineCell
- modifs multiples de C_StyleAgent, C_IconSelector et les xml de .rs associés
- récupération formatage de code SimMasto
</commit_message>
<xml_diff>
--- a/icons/20240723-iconesPNMC.pptx
+++ b/icons/20240723-iconesPNMC.pptx
@@ -244,7 +244,7 @@
           <a:p>
             <a:fld id="{D69CC91C-3FCF-491C-901A-4654FCD0FDAC}" type="datetimeFigureOut">
               <a:rPr lang="fr-FR" smtClean="0"/>
-              <a:t>14/11/2024</a:t>
+              <a:t>20/11/2024</a:t>
             </a:fld>
             <a:endParaRPr lang="fr-FR"/>
           </a:p>
@@ -414,7 +414,7 @@
           <a:p>
             <a:fld id="{D69CC91C-3FCF-491C-901A-4654FCD0FDAC}" type="datetimeFigureOut">
               <a:rPr lang="fr-FR" smtClean="0"/>
-              <a:t>14/11/2024</a:t>
+              <a:t>20/11/2024</a:t>
             </a:fld>
             <a:endParaRPr lang="fr-FR"/>
           </a:p>
@@ -594,7 +594,7 @@
           <a:p>
             <a:fld id="{D69CC91C-3FCF-491C-901A-4654FCD0FDAC}" type="datetimeFigureOut">
               <a:rPr lang="fr-FR" smtClean="0"/>
-              <a:t>14/11/2024</a:t>
+              <a:t>20/11/2024</a:t>
             </a:fld>
             <a:endParaRPr lang="fr-FR"/>
           </a:p>
@@ -764,7 +764,7 @@
           <a:p>
             <a:fld id="{D69CC91C-3FCF-491C-901A-4654FCD0FDAC}" type="datetimeFigureOut">
               <a:rPr lang="fr-FR" smtClean="0"/>
-              <a:t>14/11/2024</a:t>
+              <a:t>20/11/2024</a:t>
             </a:fld>
             <a:endParaRPr lang="fr-FR"/>
           </a:p>
@@ -1010,7 +1010,7 @@
           <a:p>
             <a:fld id="{D69CC91C-3FCF-491C-901A-4654FCD0FDAC}" type="datetimeFigureOut">
               <a:rPr lang="fr-FR" smtClean="0"/>
-              <a:t>14/11/2024</a:t>
+              <a:t>20/11/2024</a:t>
             </a:fld>
             <a:endParaRPr lang="fr-FR"/>
           </a:p>
@@ -1242,7 +1242,7 @@
           <a:p>
             <a:fld id="{D69CC91C-3FCF-491C-901A-4654FCD0FDAC}" type="datetimeFigureOut">
               <a:rPr lang="fr-FR" smtClean="0"/>
-              <a:t>14/11/2024</a:t>
+              <a:t>20/11/2024</a:t>
             </a:fld>
             <a:endParaRPr lang="fr-FR"/>
           </a:p>
@@ -1609,7 +1609,7 @@
           <a:p>
             <a:fld id="{D69CC91C-3FCF-491C-901A-4654FCD0FDAC}" type="datetimeFigureOut">
               <a:rPr lang="fr-FR" smtClean="0"/>
-              <a:t>14/11/2024</a:t>
+              <a:t>20/11/2024</a:t>
             </a:fld>
             <a:endParaRPr lang="fr-FR"/>
           </a:p>
@@ -1727,7 +1727,7 @@
           <a:p>
             <a:fld id="{D69CC91C-3FCF-491C-901A-4654FCD0FDAC}" type="datetimeFigureOut">
               <a:rPr lang="fr-FR" smtClean="0"/>
-              <a:t>14/11/2024</a:t>
+              <a:t>20/11/2024</a:t>
             </a:fld>
             <a:endParaRPr lang="fr-FR"/>
           </a:p>
@@ -1822,7 +1822,7 @@
           <a:p>
             <a:fld id="{D69CC91C-3FCF-491C-901A-4654FCD0FDAC}" type="datetimeFigureOut">
               <a:rPr lang="fr-FR" smtClean="0"/>
-              <a:t>14/11/2024</a:t>
+              <a:t>20/11/2024</a:t>
             </a:fld>
             <a:endParaRPr lang="fr-FR"/>
           </a:p>
@@ -2099,7 +2099,7 @@
           <a:p>
             <a:fld id="{D69CC91C-3FCF-491C-901A-4654FCD0FDAC}" type="datetimeFigureOut">
               <a:rPr lang="fr-FR" smtClean="0"/>
-              <a:t>14/11/2024</a:t>
+              <a:t>20/11/2024</a:t>
             </a:fld>
             <a:endParaRPr lang="fr-FR"/>
           </a:p>
@@ -2352,7 +2352,7 @@
           <a:p>
             <a:fld id="{D69CC91C-3FCF-491C-901A-4654FCD0FDAC}" type="datetimeFigureOut">
               <a:rPr lang="fr-FR" smtClean="0"/>
-              <a:t>14/11/2024</a:t>
+              <a:t>20/11/2024</a:t>
             </a:fld>
             <a:endParaRPr lang="fr-FR"/>
           </a:p>
@@ -2565,7 +2565,7 @@
           <a:p>
             <a:fld id="{D69CC91C-3FCF-491C-901A-4654FCD0FDAC}" type="datetimeFigureOut">
               <a:rPr lang="fr-FR" smtClean="0"/>
-              <a:t>14/11/2024</a:t>
+              <a:t>20/11/2024</a:t>
             </a:fld>
             <a:endParaRPr lang="fr-FR"/>
           </a:p>
@@ -3426,6 +3426,326 @@
           </a:p>
         </p:txBody>
       </p:sp>
+      <p:sp>
+        <p:nvSpPr>
+          <p:cNvPr id="17" name="Triangle isocèle 16"/>
+          <p:cNvSpPr/>
+          <p:nvPr/>
+        </p:nvSpPr>
+        <p:spPr>
+          <a:xfrm>
+            <a:off x="5607050" y="244899"/>
+            <a:ext cx="419100" cy="652710"/>
+          </a:xfrm>
+          <a:prstGeom prst="triangle">
+            <a:avLst/>
+          </a:prstGeom>
+        </p:spPr>
+        <p:style>
+          <a:lnRef idx="2">
+            <a:schemeClr val="accent1">
+              <a:shade val="50000"/>
+            </a:schemeClr>
+          </a:lnRef>
+          <a:fillRef idx="1">
+            <a:schemeClr val="accent1"/>
+          </a:fillRef>
+          <a:effectRef idx="0">
+            <a:schemeClr val="accent1"/>
+          </a:effectRef>
+          <a:fontRef idx="minor">
+            <a:schemeClr val="lt1"/>
+          </a:fontRef>
+        </p:style>
+        <p:txBody>
+          <a:bodyPr rtlCol="0" anchor="ctr"/>
+          <a:lstStyle/>
+          <a:p>
+            <a:pPr algn="ctr"/>
+            <a:endParaRPr lang="fr-FR"/>
+          </a:p>
+        </p:txBody>
+      </p:sp>
+      <p:sp>
+        <p:nvSpPr>
+          <p:cNvPr id="18" name="Triangle isocèle 17"/>
+          <p:cNvSpPr/>
+          <p:nvPr/>
+        </p:nvSpPr>
+        <p:spPr>
+          <a:xfrm rot="2700000">
+            <a:off x="5607050" y="1016756"/>
+            <a:ext cx="419100" cy="652710"/>
+          </a:xfrm>
+          <a:prstGeom prst="triangle">
+            <a:avLst/>
+          </a:prstGeom>
+        </p:spPr>
+        <p:style>
+          <a:lnRef idx="2">
+            <a:schemeClr val="accent1">
+              <a:shade val="50000"/>
+            </a:schemeClr>
+          </a:lnRef>
+          <a:fillRef idx="1">
+            <a:schemeClr val="accent1"/>
+          </a:fillRef>
+          <a:effectRef idx="0">
+            <a:schemeClr val="accent1"/>
+          </a:effectRef>
+          <a:fontRef idx="minor">
+            <a:schemeClr val="lt1"/>
+          </a:fontRef>
+        </p:style>
+        <p:txBody>
+          <a:bodyPr rtlCol="0" anchor="ctr"/>
+          <a:lstStyle/>
+          <a:p>
+            <a:pPr algn="ctr"/>
+            <a:endParaRPr lang="fr-FR"/>
+          </a:p>
+        </p:txBody>
+      </p:sp>
+      <p:sp>
+        <p:nvSpPr>
+          <p:cNvPr id="19" name="Triangle isocèle 18"/>
+          <p:cNvSpPr/>
+          <p:nvPr/>
+        </p:nvSpPr>
+        <p:spPr>
+          <a:xfrm rot="5400000">
+            <a:off x="5607050" y="1788613"/>
+            <a:ext cx="419100" cy="652710"/>
+          </a:xfrm>
+          <a:prstGeom prst="triangle">
+            <a:avLst/>
+          </a:prstGeom>
+        </p:spPr>
+        <p:style>
+          <a:lnRef idx="2">
+            <a:schemeClr val="accent1">
+              <a:shade val="50000"/>
+            </a:schemeClr>
+          </a:lnRef>
+          <a:fillRef idx="1">
+            <a:schemeClr val="accent1"/>
+          </a:fillRef>
+          <a:effectRef idx="0">
+            <a:schemeClr val="accent1"/>
+          </a:effectRef>
+          <a:fontRef idx="minor">
+            <a:schemeClr val="lt1"/>
+          </a:fontRef>
+        </p:style>
+        <p:txBody>
+          <a:bodyPr rtlCol="0" anchor="ctr"/>
+          <a:lstStyle/>
+          <a:p>
+            <a:pPr algn="ctr"/>
+            <a:endParaRPr lang="fr-FR"/>
+          </a:p>
+        </p:txBody>
+      </p:sp>
+      <p:sp>
+        <p:nvSpPr>
+          <p:cNvPr id="20" name="Triangle isocèle 19"/>
+          <p:cNvSpPr/>
+          <p:nvPr/>
+        </p:nvSpPr>
+        <p:spPr>
+          <a:xfrm rot="8100000">
+            <a:off x="5607050" y="2560470"/>
+            <a:ext cx="419100" cy="652710"/>
+          </a:xfrm>
+          <a:prstGeom prst="triangle">
+            <a:avLst/>
+          </a:prstGeom>
+        </p:spPr>
+        <p:style>
+          <a:lnRef idx="2">
+            <a:schemeClr val="accent1">
+              <a:shade val="50000"/>
+            </a:schemeClr>
+          </a:lnRef>
+          <a:fillRef idx="1">
+            <a:schemeClr val="accent1"/>
+          </a:fillRef>
+          <a:effectRef idx="0">
+            <a:schemeClr val="accent1"/>
+          </a:effectRef>
+          <a:fontRef idx="minor">
+            <a:schemeClr val="lt1"/>
+          </a:fontRef>
+        </p:style>
+        <p:txBody>
+          <a:bodyPr rtlCol="0" anchor="ctr"/>
+          <a:lstStyle/>
+          <a:p>
+            <a:pPr algn="ctr"/>
+            <a:endParaRPr lang="fr-FR"/>
+          </a:p>
+        </p:txBody>
+      </p:sp>
+      <p:sp>
+        <p:nvSpPr>
+          <p:cNvPr id="21" name="Triangle isocèle 20"/>
+          <p:cNvSpPr/>
+          <p:nvPr/>
+        </p:nvSpPr>
+        <p:spPr>
+          <a:xfrm rot="10800000">
+            <a:off x="5607050" y="3332327"/>
+            <a:ext cx="419100" cy="652710"/>
+          </a:xfrm>
+          <a:prstGeom prst="triangle">
+            <a:avLst/>
+          </a:prstGeom>
+        </p:spPr>
+        <p:style>
+          <a:lnRef idx="2">
+            <a:schemeClr val="accent1">
+              <a:shade val="50000"/>
+            </a:schemeClr>
+          </a:lnRef>
+          <a:fillRef idx="1">
+            <a:schemeClr val="accent1"/>
+          </a:fillRef>
+          <a:effectRef idx="0">
+            <a:schemeClr val="accent1"/>
+          </a:effectRef>
+          <a:fontRef idx="minor">
+            <a:schemeClr val="lt1"/>
+          </a:fontRef>
+        </p:style>
+        <p:txBody>
+          <a:bodyPr rtlCol="0" anchor="ctr"/>
+          <a:lstStyle/>
+          <a:p>
+            <a:pPr algn="ctr"/>
+            <a:endParaRPr lang="fr-FR"/>
+          </a:p>
+        </p:txBody>
+      </p:sp>
+      <p:sp>
+        <p:nvSpPr>
+          <p:cNvPr id="22" name="Triangle isocèle 21"/>
+          <p:cNvSpPr/>
+          <p:nvPr/>
+        </p:nvSpPr>
+        <p:spPr>
+          <a:xfrm rot="13500000">
+            <a:off x="5607050" y="4104184"/>
+            <a:ext cx="419100" cy="652710"/>
+          </a:xfrm>
+          <a:prstGeom prst="triangle">
+            <a:avLst/>
+          </a:prstGeom>
+        </p:spPr>
+        <p:style>
+          <a:lnRef idx="2">
+            <a:schemeClr val="accent1">
+              <a:shade val="50000"/>
+            </a:schemeClr>
+          </a:lnRef>
+          <a:fillRef idx="1">
+            <a:schemeClr val="accent1"/>
+          </a:fillRef>
+          <a:effectRef idx="0">
+            <a:schemeClr val="accent1"/>
+          </a:effectRef>
+          <a:fontRef idx="minor">
+            <a:schemeClr val="lt1"/>
+          </a:fontRef>
+        </p:style>
+        <p:txBody>
+          <a:bodyPr rtlCol="0" anchor="ctr"/>
+          <a:lstStyle/>
+          <a:p>
+            <a:pPr algn="ctr"/>
+            <a:endParaRPr lang="fr-FR"/>
+          </a:p>
+        </p:txBody>
+      </p:sp>
+      <p:sp>
+        <p:nvSpPr>
+          <p:cNvPr id="23" name="Triangle isocèle 22"/>
+          <p:cNvSpPr/>
+          <p:nvPr/>
+        </p:nvSpPr>
+        <p:spPr>
+          <a:xfrm rot="16200000">
+            <a:off x="5607050" y="4876041"/>
+            <a:ext cx="419100" cy="652710"/>
+          </a:xfrm>
+          <a:prstGeom prst="triangle">
+            <a:avLst/>
+          </a:prstGeom>
+        </p:spPr>
+        <p:style>
+          <a:lnRef idx="2">
+            <a:schemeClr val="accent1">
+              <a:shade val="50000"/>
+            </a:schemeClr>
+          </a:lnRef>
+          <a:fillRef idx="1">
+            <a:schemeClr val="accent1"/>
+          </a:fillRef>
+          <a:effectRef idx="0">
+            <a:schemeClr val="accent1"/>
+          </a:effectRef>
+          <a:fontRef idx="minor">
+            <a:schemeClr val="lt1"/>
+          </a:fontRef>
+        </p:style>
+        <p:txBody>
+          <a:bodyPr rtlCol="0" anchor="ctr"/>
+          <a:lstStyle/>
+          <a:p>
+            <a:pPr algn="ctr"/>
+            <a:endParaRPr lang="fr-FR"/>
+          </a:p>
+        </p:txBody>
+      </p:sp>
+      <p:sp>
+        <p:nvSpPr>
+          <p:cNvPr id="24" name="Triangle isocèle 23"/>
+          <p:cNvSpPr/>
+          <p:nvPr/>
+        </p:nvSpPr>
+        <p:spPr>
+          <a:xfrm rot="18900000">
+            <a:off x="5607050" y="5647898"/>
+            <a:ext cx="419100" cy="652710"/>
+          </a:xfrm>
+          <a:prstGeom prst="triangle">
+            <a:avLst/>
+          </a:prstGeom>
+        </p:spPr>
+        <p:style>
+          <a:lnRef idx="2">
+            <a:schemeClr val="accent1">
+              <a:shade val="50000"/>
+            </a:schemeClr>
+          </a:lnRef>
+          <a:fillRef idx="1">
+            <a:schemeClr val="accent1"/>
+          </a:fillRef>
+          <a:effectRef idx="0">
+            <a:schemeClr val="accent1"/>
+          </a:effectRef>
+          <a:fontRef idx="minor">
+            <a:schemeClr val="lt1"/>
+          </a:fontRef>
+        </p:style>
+        <p:txBody>
+          <a:bodyPr rtlCol="0" anchor="ctr"/>
+          <a:lstStyle/>
+          <a:p>
+            <a:pPr algn="ctr"/>
+            <a:endParaRPr lang="fr-FR"/>
+          </a:p>
+        </p:txBody>
+      </p:sp>
     </p:spTree>
     <p:extLst>
       <p:ext uri="{BB962C8B-B14F-4D97-AF65-F5344CB8AC3E}">

</xml_diff>

<commit_message>
Création du protocole PNMC_ships avec cargos
+ Suite du panel conservation énergie
</commit_message>
<xml_diff>
--- a/icons/20240723-iconesPNMC.pptx
+++ b/icons/20240723-iconesPNMC.pptx
@@ -156,10 +156,9 @@
           </a:lstStyle>
           <a:p>
             <a:r>
-              <a:rPr lang="fr-FR" smtClean="0"/>
+              <a:rPr lang="fr-FR"/>
               <a:t>Modifiez le style du titre</a:t>
             </a:r>
-            <a:endParaRPr lang="fr-FR"/>
           </a:p>
         </p:txBody>
       </p:sp>
@@ -221,10 +220,9 @@
           </a:lstStyle>
           <a:p>
             <a:r>
-              <a:rPr lang="fr-FR" smtClean="0"/>
+              <a:rPr lang="fr-FR"/>
               <a:t>Modifier le style des sous-titres du masque</a:t>
             </a:r>
-            <a:endParaRPr lang="fr-FR"/>
           </a:p>
         </p:txBody>
       </p:sp>
@@ -245,7 +243,7 @@
           <a:p>
             <a:fld id="{D69CC91C-3FCF-491C-901A-4654FCD0FDAC}" type="datetimeFigureOut">
               <a:rPr lang="fr-FR" smtClean="0"/>
-              <a:t>26/11/2024</a:t>
+              <a:t>15/10/2025</a:t>
             </a:fld>
             <a:endParaRPr lang="fr-FR"/>
           </a:p>
@@ -339,10 +337,9 @@
           <a:lstStyle/>
           <a:p>
             <a:r>
-              <a:rPr lang="fr-FR" smtClean="0"/>
+              <a:rPr lang="fr-FR"/>
               <a:t>Modifiez le style du titre</a:t>
             </a:r>
-            <a:endParaRPr lang="fr-FR"/>
           </a:p>
         </p:txBody>
       </p:sp>
@@ -363,38 +360,37 @@
           <a:p>
             <a:pPr lvl="0"/>
             <a:r>
-              <a:rPr lang="fr-FR" smtClean="0"/>
+              <a:rPr lang="fr-FR"/>
               <a:t>Modifier les styles du texte du masque</a:t>
             </a:r>
           </a:p>
           <a:p>
             <a:pPr lvl="1"/>
             <a:r>
-              <a:rPr lang="fr-FR" smtClean="0"/>
+              <a:rPr lang="fr-FR"/>
               <a:t>Deuxième niveau</a:t>
             </a:r>
           </a:p>
           <a:p>
             <a:pPr lvl="2"/>
             <a:r>
-              <a:rPr lang="fr-FR" smtClean="0"/>
+              <a:rPr lang="fr-FR"/>
               <a:t>Troisième niveau</a:t>
             </a:r>
           </a:p>
           <a:p>
             <a:pPr lvl="3"/>
             <a:r>
-              <a:rPr lang="fr-FR" smtClean="0"/>
+              <a:rPr lang="fr-FR"/>
               <a:t>Quatrième niveau</a:t>
             </a:r>
           </a:p>
           <a:p>
             <a:pPr lvl="4"/>
             <a:r>
-              <a:rPr lang="fr-FR" smtClean="0"/>
+              <a:rPr lang="fr-FR"/>
               <a:t>Cinquième niveau</a:t>
             </a:r>
-            <a:endParaRPr lang="fr-FR"/>
           </a:p>
         </p:txBody>
       </p:sp>
@@ -415,7 +411,7 @@
           <a:p>
             <a:fld id="{D69CC91C-3FCF-491C-901A-4654FCD0FDAC}" type="datetimeFigureOut">
               <a:rPr lang="fr-FR" smtClean="0"/>
-              <a:t>26/11/2024</a:t>
+              <a:t>15/10/2025</a:t>
             </a:fld>
             <a:endParaRPr lang="fr-FR"/>
           </a:p>
@@ -514,10 +510,9 @@
           <a:lstStyle/>
           <a:p>
             <a:r>
-              <a:rPr lang="fr-FR" smtClean="0"/>
+              <a:rPr lang="fr-FR"/>
               <a:t>Modifiez le style du titre</a:t>
             </a:r>
-            <a:endParaRPr lang="fr-FR"/>
           </a:p>
         </p:txBody>
       </p:sp>
@@ -543,38 +538,37 @@
           <a:p>
             <a:pPr lvl="0"/>
             <a:r>
-              <a:rPr lang="fr-FR" smtClean="0"/>
+              <a:rPr lang="fr-FR"/>
               <a:t>Modifier les styles du texte du masque</a:t>
             </a:r>
           </a:p>
           <a:p>
             <a:pPr lvl="1"/>
             <a:r>
-              <a:rPr lang="fr-FR" smtClean="0"/>
+              <a:rPr lang="fr-FR"/>
               <a:t>Deuxième niveau</a:t>
             </a:r>
           </a:p>
           <a:p>
             <a:pPr lvl="2"/>
             <a:r>
-              <a:rPr lang="fr-FR" smtClean="0"/>
+              <a:rPr lang="fr-FR"/>
               <a:t>Troisième niveau</a:t>
             </a:r>
           </a:p>
           <a:p>
             <a:pPr lvl="3"/>
             <a:r>
-              <a:rPr lang="fr-FR" smtClean="0"/>
+              <a:rPr lang="fr-FR"/>
               <a:t>Quatrième niveau</a:t>
             </a:r>
           </a:p>
           <a:p>
             <a:pPr lvl="4"/>
             <a:r>
-              <a:rPr lang="fr-FR" smtClean="0"/>
+              <a:rPr lang="fr-FR"/>
               <a:t>Cinquième niveau</a:t>
             </a:r>
-            <a:endParaRPr lang="fr-FR"/>
           </a:p>
         </p:txBody>
       </p:sp>
@@ -595,7 +589,7 @@
           <a:p>
             <a:fld id="{D69CC91C-3FCF-491C-901A-4654FCD0FDAC}" type="datetimeFigureOut">
               <a:rPr lang="fr-FR" smtClean="0"/>
-              <a:t>26/11/2024</a:t>
+              <a:t>15/10/2025</a:t>
             </a:fld>
             <a:endParaRPr lang="fr-FR"/>
           </a:p>
@@ -689,10 +683,9 @@
           <a:lstStyle/>
           <a:p>
             <a:r>
-              <a:rPr lang="fr-FR" smtClean="0"/>
+              <a:rPr lang="fr-FR"/>
               <a:t>Modifiez le style du titre</a:t>
             </a:r>
-            <a:endParaRPr lang="fr-FR"/>
           </a:p>
         </p:txBody>
       </p:sp>
@@ -713,38 +706,37 @@
           <a:p>
             <a:pPr lvl="0"/>
             <a:r>
-              <a:rPr lang="fr-FR" smtClean="0"/>
+              <a:rPr lang="fr-FR"/>
               <a:t>Modifier les styles du texte du masque</a:t>
             </a:r>
           </a:p>
           <a:p>
             <a:pPr lvl="1"/>
             <a:r>
-              <a:rPr lang="fr-FR" smtClean="0"/>
+              <a:rPr lang="fr-FR"/>
               <a:t>Deuxième niveau</a:t>
             </a:r>
           </a:p>
           <a:p>
             <a:pPr lvl="2"/>
             <a:r>
-              <a:rPr lang="fr-FR" smtClean="0"/>
+              <a:rPr lang="fr-FR"/>
               <a:t>Troisième niveau</a:t>
             </a:r>
           </a:p>
           <a:p>
             <a:pPr lvl="3"/>
             <a:r>
-              <a:rPr lang="fr-FR" smtClean="0"/>
+              <a:rPr lang="fr-FR"/>
               <a:t>Quatrième niveau</a:t>
             </a:r>
           </a:p>
           <a:p>
             <a:pPr lvl="4"/>
             <a:r>
-              <a:rPr lang="fr-FR" smtClean="0"/>
+              <a:rPr lang="fr-FR"/>
               <a:t>Cinquième niveau</a:t>
             </a:r>
-            <a:endParaRPr lang="fr-FR"/>
           </a:p>
         </p:txBody>
       </p:sp>
@@ -765,7 +757,7 @@
           <a:p>
             <a:fld id="{D69CC91C-3FCF-491C-901A-4654FCD0FDAC}" type="datetimeFigureOut">
               <a:rPr lang="fr-FR" smtClean="0"/>
-              <a:t>26/11/2024</a:t>
+              <a:t>15/10/2025</a:t>
             </a:fld>
             <a:endParaRPr lang="fr-FR"/>
           </a:p>
@@ -868,10 +860,9 @@
           </a:lstStyle>
           <a:p>
             <a:r>
-              <a:rPr lang="fr-FR" smtClean="0"/>
+              <a:rPr lang="fr-FR"/>
               <a:t>Modifiez le style du titre</a:t>
             </a:r>
-            <a:endParaRPr lang="fr-FR"/>
           </a:p>
         </p:txBody>
       </p:sp>
@@ -988,7 +979,7 @@
           <a:p>
             <a:pPr lvl="0"/>
             <a:r>
-              <a:rPr lang="fr-FR" smtClean="0"/>
+              <a:rPr lang="fr-FR"/>
               <a:t>Modifier les styles du texte du masque</a:t>
             </a:r>
           </a:p>
@@ -1011,7 +1002,7 @@
           <a:p>
             <a:fld id="{D69CC91C-3FCF-491C-901A-4654FCD0FDAC}" type="datetimeFigureOut">
               <a:rPr lang="fr-FR" smtClean="0"/>
-              <a:t>26/11/2024</a:t>
+              <a:t>15/10/2025</a:t>
             </a:fld>
             <a:endParaRPr lang="fr-FR"/>
           </a:p>
@@ -1105,10 +1096,9 @@
           <a:lstStyle/>
           <a:p>
             <a:r>
-              <a:rPr lang="fr-FR" smtClean="0"/>
+              <a:rPr lang="fr-FR"/>
               <a:t>Modifiez le style du titre</a:t>
             </a:r>
-            <a:endParaRPr lang="fr-FR"/>
           </a:p>
         </p:txBody>
       </p:sp>
@@ -1134,38 +1124,37 @@
           <a:p>
             <a:pPr lvl="0"/>
             <a:r>
-              <a:rPr lang="fr-FR" smtClean="0"/>
+              <a:rPr lang="fr-FR"/>
               <a:t>Modifier les styles du texte du masque</a:t>
             </a:r>
           </a:p>
           <a:p>
             <a:pPr lvl="1"/>
             <a:r>
-              <a:rPr lang="fr-FR" smtClean="0"/>
+              <a:rPr lang="fr-FR"/>
               <a:t>Deuxième niveau</a:t>
             </a:r>
           </a:p>
           <a:p>
             <a:pPr lvl="2"/>
             <a:r>
-              <a:rPr lang="fr-FR" smtClean="0"/>
+              <a:rPr lang="fr-FR"/>
               <a:t>Troisième niveau</a:t>
             </a:r>
           </a:p>
           <a:p>
             <a:pPr lvl="3"/>
             <a:r>
-              <a:rPr lang="fr-FR" smtClean="0"/>
+              <a:rPr lang="fr-FR"/>
               <a:t>Quatrième niveau</a:t>
             </a:r>
           </a:p>
           <a:p>
             <a:pPr lvl="4"/>
             <a:r>
-              <a:rPr lang="fr-FR" smtClean="0"/>
+              <a:rPr lang="fr-FR"/>
               <a:t>Cinquième niveau</a:t>
             </a:r>
-            <a:endParaRPr lang="fr-FR"/>
           </a:p>
         </p:txBody>
       </p:sp>
@@ -1191,38 +1180,37 @@
           <a:p>
             <a:pPr lvl="0"/>
             <a:r>
-              <a:rPr lang="fr-FR" smtClean="0"/>
+              <a:rPr lang="fr-FR"/>
               <a:t>Modifier les styles du texte du masque</a:t>
             </a:r>
           </a:p>
           <a:p>
             <a:pPr lvl="1"/>
             <a:r>
-              <a:rPr lang="fr-FR" smtClean="0"/>
+              <a:rPr lang="fr-FR"/>
               <a:t>Deuxième niveau</a:t>
             </a:r>
           </a:p>
           <a:p>
             <a:pPr lvl="2"/>
             <a:r>
-              <a:rPr lang="fr-FR" smtClean="0"/>
+              <a:rPr lang="fr-FR"/>
               <a:t>Troisième niveau</a:t>
             </a:r>
           </a:p>
           <a:p>
             <a:pPr lvl="3"/>
             <a:r>
-              <a:rPr lang="fr-FR" smtClean="0"/>
+              <a:rPr lang="fr-FR"/>
               <a:t>Quatrième niveau</a:t>
             </a:r>
           </a:p>
           <a:p>
             <a:pPr lvl="4"/>
             <a:r>
-              <a:rPr lang="fr-FR" smtClean="0"/>
+              <a:rPr lang="fr-FR"/>
               <a:t>Cinquième niveau</a:t>
             </a:r>
-            <a:endParaRPr lang="fr-FR"/>
           </a:p>
         </p:txBody>
       </p:sp>
@@ -1243,7 +1231,7 @@
           <a:p>
             <a:fld id="{D69CC91C-3FCF-491C-901A-4654FCD0FDAC}" type="datetimeFigureOut">
               <a:rPr lang="fr-FR" smtClean="0"/>
-              <a:t>26/11/2024</a:t>
+              <a:t>15/10/2025</a:t>
             </a:fld>
             <a:endParaRPr lang="fr-FR"/>
           </a:p>
@@ -1342,10 +1330,9 @@
           <a:lstStyle/>
           <a:p>
             <a:r>
-              <a:rPr lang="fr-FR" smtClean="0"/>
+              <a:rPr lang="fr-FR"/>
               <a:t>Modifiez le style du titre</a:t>
             </a:r>
-            <a:endParaRPr lang="fr-FR"/>
           </a:p>
         </p:txBody>
       </p:sp>
@@ -1408,7 +1395,7 @@
           <a:p>
             <a:pPr lvl="0"/>
             <a:r>
-              <a:rPr lang="fr-FR" smtClean="0"/>
+              <a:rPr lang="fr-FR"/>
               <a:t>Modifier les styles du texte du masque</a:t>
             </a:r>
           </a:p>
@@ -1436,38 +1423,37 @@
           <a:p>
             <a:pPr lvl="0"/>
             <a:r>
-              <a:rPr lang="fr-FR" smtClean="0"/>
+              <a:rPr lang="fr-FR"/>
               <a:t>Modifier les styles du texte du masque</a:t>
             </a:r>
           </a:p>
           <a:p>
             <a:pPr lvl="1"/>
             <a:r>
-              <a:rPr lang="fr-FR" smtClean="0"/>
+              <a:rPr lang="fr-FR"/>
               <a:t>Deuxième niveau</a:t>
             </a:r>
           </a:p>
           <a:p>
             <a:pPr lvl="2"/>
             <a:r>
-              <a:rPr lang="fr-FR" smtClean="0"/>
+              <a:rPr lang="fr-FR"/>
               <a:t>Troisième niveau</a:t>
             </a:r>
           </a:p>
           <a:p>
             <a:pPr lvl="3"/>
             <a:r>
-              <a:rPr lang="fr-FR" smtClean="0"/>
+              <a:rPr lang="fr-FR"/>
               <a:t>Quatrième niveau</a:t>
             </a:r>
           </a:p>
           <a:p>
             <a:pPr lvl="4"/>
             <a:r>
-              <a:rPr lang="fr-FR" smtClean="0"/>
+              <a:rPr lang="fr-FR"/>
               <a:t>Cinquième niveau</a:t>
             </a:r>
-            <a:endParaRPr lang="fr-FR"/>
           </a:p>
         </p:txBody>
       </p:sp>
@@ -1530,7 +1516,7 @@
           <a:p>
             <a:pPr lvl="0"/>
             <a:r>
-              <a:rPr lang="fr-FR" smtClean="0"/>
+              <a:rPr lang="fr-FR"/>
               <a:t>Modifier les styles du texte du masque</a:t>
             </a:r>
           </a:p>
@@ -1558,38 +1544,37 @@
           <a:p>
             <a:pPr lvl="0"/>
             <a:r>
-              <a:rPr lang="fr-FR" smtClean="0"/>
+              <a:rPr lang="fr-FR"/>
               <a:t>Modifier les styles du texte du masque</a:t>
             </a:r>
           </a:p>
           <a:p>
             <a:pPr lvl="1"/>
             <a:r>
-              <a:rPr lang="fr-FR" smtClean="0"/>
+              <a:rPr lang="fr-FR"/>
               <a:t>Deuxième niveau</a:t>
             </a:r>
           </a:p>
           <a:p>
             <a:pPr lvl="2"/>
             <a:r>
-              <a:rPr lang="fr-FR" smtClean="0"/>
+              <a:rPr lang="fr-FR"/>
               <a:t>Troisième niveau</a:t>
             </a:r>
           </a:p>
           <a:p>
             <a:pPr lvl="3"/>
             <a:r>
-              <a:rPr lang="fr-FR" smtClean="0"/>
+              <a:rPr lang="fr-FR"/>
               <a:t>Quatrième niveau</a:t>
             </a:r>
           </a:p>
           <a:p>
             <a:pPr lvl="4"/>
             <a:r>
-              <a:rPr lang="fr-FR" smtClean="0"/>
+              <a:rPr lang="fr-FR"/>
               <a:t>Cinquième niveau</a:t>
             </a:r>
-            <a:endParaRPr lang="fr-FR"/>
           </a:p>
         </p:txBody>
       </p:sp>
@@ -1610,7 +1595,7 @@
           <a:p>
             <a:fld id="{D69CC91C-3FCF-491C-901A-4654FCD0FDAC}" type="datetimeFigureOut">
               <a:rPr lang="fr-FR" smtClean="0"/>
-              <a:t>26/11/2024</a:t>
+              <a:t>15/10/2025</a:t>
             </a:fld>
             <a:endParaRPr lang="fr-FR"/>
           </a:p>
@@ -1704,10 +1689,9 @@
           <a:lstStyle/>
           <a:p>
             <a:r>
-              <a:rPr lang="fr-FR" smtClean="0"/>
+              <a:rPr lang="fr-FR"/>
               <a:t>Modifiez le style du titre</a:t>
             </a:r>
-            <a:endParaRPr lang="fr-FR"/>
           </a:p>
         </p:txBody>
       </p:sp>
@@ -1728,7 +1712,7 @@
           <a:p>
             <a:fld id="{D69CC91C-3FCF-491C-901A-4654FCD0FDAC}" type="datetimeFigureOut">
               <a:rPr lang="fr-FR" smtClean="0"/>
-              <a:t>26/11/2024</a:t>
+              <a:t>15/10/2025</a:t>
             </a:fld>
             <a:endParaRPr lang="fr-FR"/>
           </a:p>
@@ -1823,7 +1807,7 @@
           <a:p>
             <a:fld id="{D69CC91C-3FCF-491C-901A-4654FCD0FDAC}" type="datetimeFigureOut">
               <a:rPr lang="fr-FR" smtClean="0"/>
-              <a:t>26/11/2024</a:t>
+              <a:t>15/10/2025</a:t>
             </a:fld>
             <a:endParaRPr lang="fr-FR"/>
           </a:p>
@@ -1926,10 +1910,9 @@
           </a:lstStyle>
           <a:p>
             <a:r>
-              <a:rPr lang="fr-FR" smtClean="0"/>
+              <a:rPr lang="fr-FR"/>
               <a:t>Modifiez le style du titre</a:t>
             </a:r>
-            <a:endParaRPr lang="fr-FR"/>
           </a:p>
         </p:txBody>
       </p:sp>
@@ -1983,38 +1966,37 @@
           <a:p>
             <a:pPr lvl="0"/>
             <a:r>
-              <a:rPr lang="fr-FR" smtClean="0"/>
+              <a:rPr lang="fr-FR"/>
               <a:t>Modifier les styles du texte du masque</a:t>
             </a:r>
           </a:p>
           <a:p>
             <a:pPr lvl="1"/>
             <a:r>
-              <a:rPr lang="fr-FR" smtClean="0"/>
+              <a:rPr lang="fr-FR"/>
               <a:t>Deuxième niveau</a:t>
             </a:r>
           </a:p>
           <a:p>
             <a:pPr lvl="2"/>
             <a:r>
-              <a:rPr lang="fr-FR" smtClean="0"/>
+              <a:rPr lang="fr-FR"/>
               <a:t>Troisième niveau</a:t>
             </a:r>
           </a:p>
           <a:p>
             <a:pPr lvl="3"/>
             <a:r>
-              <a:rPr lang="fr-FR" smtClean="0"/>
+              <a:rPr lang="fr-FR"/>
               <a:t>Quatrième niveau</a:t>
             </a:r>
           </a:p>
           <a:p>
             <a:pPr lvl="4"/>
             <a:r>
-              <a:rPr lang="fr-FR" smtClean="0"/>
+              <a:rPr lang="fr-FR"/>
               <a:t>Cinquième niveau</a:t>
             </a:r>
-            <a:endParaRPr lang="fr-FR"/>
           </a:p>
         </p:txBody>
       </p:sp>
@@ -2077,7 +2059,7 @@
           <a:p>
             <a:pPr lvl="0"/>
             <a:r>
-              <a:rPr lang="fr-FR" smtClean="0"/>
+              <a:rPr lang="fr-FR"/>
               <a:t>Modifier les styles du texte du masque</a:t>
             </a:r>
           </a:p>
@@ -2100,7 +2082,7 @@
           <a:p>
             <a:fld id="{D69CC91C-3FCF-491C-901A-4654FCD0FDAC}" type="datetimeFigureOut">
               <a:rPr lang="fr-FR" smtClean="0"/>
-              <a:t>26/11/2024</a:t>
+              <a:t>15/10/2025</a:t>
             </a:fld>
             <a:endParaRPr lang="fr-FR"/>
           </a:p>
@@ -2203,10 +2185,9 @@
           </a:lstStyle>
           <a:p>
             <a:r>
-              <a:rPr lang="fr-FR" smtClean="0"/>
+              <a:rPr lang="fr-FR"/>
               <a:t>Modifiez le style du titre</a:t>
             </a:r>
-            <a:endParaRPr lang="fr-FR"/>
           </a:p>
         </p:txBody>
       </p:sp>
@@ -2330,7 +2311,7 @@
           <a:p>
             <a:pPr lvl="0"/>
             <a:r>
-              <a:rPr lang="fr-FR" smtClean="0"/>
+              <a:rPr lang="fr-FR"/>
               <a:t>Modifier les styles du texte du masque</a:t>
             </a:r>
           </a:p>
@@ -2353,7 +2334,7 @@
           <a:p>
             <a:fld id="{D69CC91C-3FCF-491C-901A-4654FCD0FDAC}" type="datetimeFigureOut">
               <a:rPr lang="fr-FR" smtClean="0"/>
-              <a:t>26/11/2024</a:t>
+              <a:t>15/10/2025</a:t>
             </a:fld>
             <a:endParaRPr lang="fr-FR"/>
           </a:p>
@@ -2462,10 +2443,9 @@
           <a:lstStyle/>
           <a:p>
             <a:r>
-              <a:rPr lang="fr-FR" smtClean="0"/>
+              <a:rPr lang="fr-FR"/>
               <a:t>Modifiez le style du titre</a:t>
             </a:r>
-            <a:endParaRPr lang="fr-FR"/>
           </a:p>
         </p:txBody>
       </p:sp>
@@ -2496,38 +2476,37 @@
           <a:p>
             <a:pPr lvl="0"/>
             <a:r>
-              <a:rPr lang="fr-FR" smtClean="0"/>
+              <a:rPr lang="fr-FR"/>
               <a:t>Modifier les styles du texte du masque</a:t>
             </a:r>
           </a:p>
           <a:p>
             <a:pPr lvl="1"/>
             <a:r>
-              <a:rPr lang="fr-FR" smtClean="0"/>
+              <a:rPr lang="fr-FR"/>
               <a:t>Deuxième niveau</a:t>
             </a:r>
           </a:p>
           <a:p>
             <a:pPr lvl="2"/>
             <a:r>
-              <a:rPr lang="fr-FR" smtClean="0"/>
+              <a:rPr lang="fr-FR"/>
               <a:t>Troisième niveau</a:t>
             </a:r>
           </a:p>
           <a:p>
             <a:pPr lvl="3"/>
             <a:r>
-              <a:rPr lang="fr-FR" smtClean="0"/>
+              <a:rPr lang="fr-FR"/>
               <a:t>Quatrième niveau</a:t>
             </a:r>
           </a:p>
           <a:p>
             <a:pPr lvl="4"/>
             <a:r>
-              <a:rPr lang="fr-FR" smtClean="0"/>
+              <a:rPr lang="fr-FR"/>
               <a:t>Cinquième niveau</a:t>
             </a:r>
-            <a:endParaRPr lang="fr-FR"/>
           </a:p>
         </p:txBody>
       </p:sp>
@@ -2566,7 +2545,7 @@
           <a:p>
             <a:fld id="{D69CC91C-3FCF-491C-901A-4654FCD0FDAC}" type="datetimeFigureOut">
               <a:rPr lang="fr-FR" smtClean="0"/>
-              <a:t>26/11/2024</a:t>
+              <a:t>15/10/2025</a:t>
             </a:fld>
             <a:endParaRPr lang="fr-FR"/>
           </a:p>
@@ -3029,6 +3008,47 @@
           </a:p>
         </p:txBody>
       </p:sp>
+      <p:pic>
+        <p:nvPicPr>
+          <p:cNvPr id="2" name="Image 1">
+            <a:extLst>
+              <a:ext uri="{FF2B5EF4-FFF2-40B4-BE49-F238E27FC236}">
+                <a16:creationId xmlns:a16="http://schemas.microsoft.com/office/drawing/2014/main" id="{7F1AE4E8-780A-4A9F-AFF3-6FA863B812B3}"/>
+              </a:ext>
+            </a:extLst>
+          </p:cNvPr>
+          <p:cNvPicPr>
+            <a:picLocks noChangeAspect="1"/>
+          </p:cNvPicPr>
+          <p:nvPr/>
+        </p:nvPicPr>
+        <p:blipFill>
+          <a:blip r:embed="rId2">
+            <a:clrChange>
+              <a:clrFrom>
+                <a:srgbClr val="FFFFFF"/>
+              </a:clrFrom>
+              <a:clrTo>
+                <a:srgbClr val="FFFFFF">
+                  <a:alpha val="0"/>
+                </a:srgbClr>
+              </a:clrTo>
+            </a:clrChange>
+          </a:blip>
+          <a:stretch>
+            <a:fillRect/>
+          </a:stretch>
+        </p:blipFill>
+        <p:spPr>
+          <a:xfrm>
+            <a:off x="6984565" y="540690"/>
+            <a:ext cx="3258005" cy="2772162"/>
+          </a:xfrm>
+          <a:prstGeom prst="rect">
+            <a:avLst/>
+          </a:prstGeom>
+        </p:spPr>
+      </p:pic>
     </p:spTree>
     <p:extLst>
       <p:ext uri="{BB962C8B-B14F-4D97-AF65-F5344CB8AC3E}">
@@ -3848,25 +3868,25 @@
             <a:p>
               <a:pPr algn="ctr"/>
               <a:r>
-                <a:rPr lang="fr-FR" dirty="0" smtClean="0">
+                <a:rPr lang="fr-FR" dirty="0">
                   <a:latin typeface="Antonio" panose="02000503000000000000" pitchFamily="2" charset="0"/>
                 </a:rPr>
                 <a:t>Surface </a:t>
               </a:r>
               <a:r>
-                <a:rPr lang="fr-FR" dirty="0" err="1" smtClean="0">
+                <a:rPr lang="fr-FR" dirty="0" err="1">
                   <a:latin typeface="Antonio" panose="02000503000000000000" pitchFamily="2" charset="0"/>
                 </a:rPr>
                 <a:t>current</a:t>
               </a:r>
               <a:r>
-                <a:rPr lang="fr-FR" dirty="0" smtClean="0">
+                <a:rPr lang="fr-FR" dirty="0">
                   <a:latin typeface="Antonio" panose="02000503000000000000" pitchFamily="2" charset="0"/>
                 </a:rPr>
                 <a:t> </a:t>
               </a:r>
               <a:r>
-                <a:rPr lang="fr-FR" dirty="0" err="1" smtClean="0">
+                <a:rPr lang="fr-FR" dirty="0" err="1">
                   <a:latin typeface="Antonio" panose="02000503000000000000" pitchFamily="2" charset="0"/>
                 </a:rPr>
                 <a:t>aim</a:t>

</xml_diff>

<commit_message>
Correction (8h !) du bug sur protocoles rodent - correction du GUI MelaneSim
- getRodentload->retrieveRodentLoad non pris en compte dans les fichiers xml (styles burrow et city) / idem pour getFullRodentLoad
- correction du GUI nekton vs plankton dans melanesim: comme nekton hérite de plankton il faut que les test instanceof plankton soient après instanceof nekton.
</commit_message>
<xml_diff>
--- a/icons/20240723-iconesPNMC.pptx
+++ b/icons/20240723-iconesPNMC.pptx
@@ -6,8 +6,9 @@
   </p:sldMasterIdLst>
   <p:sldIdLst>
     <p:sldId id="256" r:id="rId2"/>
-    <p:sldId id="257" r:id="rId3"/>
-    <p:sldId id="258" r:id="rId4"/>
+    <p:sldId id="259" r:id="rId3"/>
+    <p:sldId id="257" r:id="rId4"/>
+    <p:sldId id="258" r:id="rId5"/>
   </p:sldIdLst>
   <p:sldSz cx="12192000" cy="6858000"/>
   <p:notesSz cx="6858000" cy="9144000"/>
@@ -243,7 +244,7 @@
           <a:p>
             <a:fld id="{D69CC91C-3FCF-491C-901A-4654FCD0FDAC}" type="datetimeFigureOut">
               <a:rPr lang="fr-FR" smtClean="0"/>
-              <a:t>15/10/2025</a:t>
+              <a:t>30/10/2025</a:t>
             </a:fld>
             <a:endParaRPr lang="fr-FR"/>
           </a:p>
@@ -411,7 +412,7 @@
           <a:p>
             <a:fld id="{D69CC91C-3FCF-491C-901A-4654FCD0FDAC}" type="datetimeFigureOut">
               <a:rPr lang="fr-FR" smtClean="0"/>
-              <a:t>15/10/2025</a:t>
+              <a:t>30/10/2025</a:t>
             </a:fld>
             <a:endParaRPr lang="fr-FR"/>
           </a:p>
@@ -589,7 +590,7 @@
           <a:p>
             <a:fld id="{D69CC91C-3FCF-491C-901A-4654FCD0FDAC}" type="datetimeFigureOut">
               <a:rPr lang="fr-FR" smtClean="0"/>
-              <a:t>15/10/2025</a:t>
+              <a:t>30/10/2025</a:t>
             </a:fld>
             <a:endParaRPr lang="fr-FR"/>
           </a:p>
@@ -757,7 +758,7 @@
           <a:p>
             <a:fld id="{D69CC91C-3FCF-491C-901A-4654FCD0FDAC}" type="datetimeFigureOut">
               <a:rPr lang="fr-FR" smtClean="0"/>
-              <a:t>15/10/2025</a:t>
+              <a:t>30/10/2025</a:t>
             </a:fld>
             <a:endParaRPr lang="fr-FR"/>
           </a:p>
@@ -1002,7 +1003,7 @@
           <a:p>
             <a:fld id="{D69CC91C-3FCF-491C-901A-4654FCD0FDAC}" type="datetimeFigureOut">
               <a:rPr lang="fr-FR" smtClean="0"/>
-              <a:t>15/10/2025</a:t>
+              <a:t>30/10/2025</a:t>
             </a:fld>
             <a:endParaRPr lang="fr-FR"/>
           </a:p>
@@ -1231,7 +1232,7 @@
           <a:p>
             <a:fld id="{D69CC91C-3FCF-491C-901A-4654FCD0FDAC}" type="datetimeFigureOut">
               <a:rPr lang="fr-FR" smtClean="0"/>
-              <a:t>15/10/2025</a:t>
+              <a:t>30/10/2025</a:t>
             </a:fld>
             <a:endParaRPr lang="fr-FR"/>
           </a:p>
@@ -1595,7 +1596,7 @@
           <a:p>
             <a:fld id="{D69CC91C-3FCF-491C-901A-4654FCD0FDAC}" type="datetimeFigureOut">
               <a:rPr lang="fr-FR" smtClean="0"/>
-              <a:t>15/10/2025</a:t>
+              <a:t>30/10/2025</a:t>
             </a:fld>
             <a:endParaRPr lang="fr-FR"/>
           </a:p>
@@ -1712,7 +1713,7 @@
           <a:p>
             <a:fld id="{D69CC91C-3FCF-491C-901A-4654FCD0FDAC}" type="datetimeFigureOut">
               <a:rPr lang="fr-FR" smtClean="0"/>
-              <a:t>15/10/2025</a:t>
+              <a:t>30/10/2025</a:t>
             </a:fld>
             <a:endParaRPr lang="fr-FR"/>
           </a:p>
@@ -1807,7 +1808,7 @@
           <a:p>
             <a:fld id="{D69CC91C-3FCF-491C-901A-4654FCD0FDAC}" type="datetimeFigureOut">
               <a:rPr lang="fr-FR" smtClean="0"/>
-              <a:t>15/10/2025</a:t>
+              <a:t>30/10/2025</a:t>
             </a:fld>
             <a:endParaRPr lang="fr-FR"/>
           </a:p>
@@ -2082,7 +2083,7 @@
           <a:p>
             <a:fld id="{D69CC91C-3FCF-491C-901A-4654FCD0FDAC}" type="datetimeFigureOut">
               <a:rPr lang="fr-FR" smtClean="0"/>
-              <a:t>15/10/2025</a:t>
+              <a:t>30/10/2025</a:t>
             </a:fld>
             <a:endParaRPr lang="fr-FR"/>
           </a:p>
@@ -2334,7 +2335,7 @@
           <a:p>
             <a:fld id="{D69CC91C-3FCF-491C-901A-4654FCD0FDAC}" type="datetimeFigureOut">
               <a:rPr lang="fr-FR" smtClean="0"/>
-              <a:t>15/10/2025</a:t>
+              <a:t>30/10/2025</a:t>
             </a:fld>
             <a:endParaRPr lang="fr-FR"/>
           </a:p>
@@ -2545,7 +2546,7 @@
           <a:p>
             <a:fld id="{D69CC91C-3FCF-491C-901A-4654FCD0FDAC}" type="datetimeFigureOut">
               <a:rPr lang="fr-FR" smtClean="0"/>
-              <a:t>15/10/2025</a:t>
+              <a:t>30/10/2025</a:t>
             </a:fld>
             <a:endParaRPr lang="fr-FR"/>
           </a:p>
@@ -2957,8 +2958,8 @@
           <p:nvPr/>
         </p:nvSpPr>
         <p:spPr>
-          <a:xfrm>
-            <a:off x="2204581" y="901874"/>
+          <a:xfrm rot="20828317">
+            <a:off x="2008389" y="432799"/>
             <a:ext cx="3720230" cy="3720230"/>
           </a:xfrm>
           <a:prstGeom prst="ellipse">
@@ -3049,6 +3050,88 @@
           </a:prstGeom>
         </p:spPr>
       </p:pic>
+      <p:pic>
+        <p:nvPicPr>
+          <p:cNvPr id="10" name="Image 9">
+            <a:extLst>
+              <a:ext uri="{FF2B5EF4-FFF2-40B4-BE49-F238E27FC236}">
+                <a16:creationId xmlns:a16="http://schemas.microsoft.com/office/drawing/2014/main" id="{53116177-E990-49CF-96DA-606800EE4B09}"/>
+              </a:ext>
+            </a:extLst>
+          </p:cNvPr>
+          <p:cNvPicPr>
+            <a:picLocks noChangeAspect="1"/>
+          </p:cNvPicPr>
+          <p:nvPr/>
+        </p:nvPicPr>
+        <p:blipFill>
+          <a:blip r:embed="rId3">
+            <a:clrChange>
+              <a:clrFrom>
+                <a:srgbClr val="FFFFFF"/>
+              </a:clrFrom>
+              <a:clrTo>
+                <a:srgbClr val="FFFFFF">
+                  <a:alpha val="0"/>
+                </a:srgbClr>
+              </a:clrTo>
+            </a:clrChange>
+          </a:blip>
+          <a:stretch>
+            <a:fillRect/>
+          </a:stretch>
+        </p:blipFill>
+        <p:spPr>
+          <a:xfrm>
+            <a:off x="835830" y="4115518"/>
+            <a:ext cx="2892915" cy="2880000"/>
+          </a:xfrm>
+          <a:prstGeom prst="rect">
+            <a:avLst/>
+          </a:prstGeom>
+        </p:spPr>
+      </p:pic>
+      <p:pic>
+        <p:nvPicPr>
+          <p:cNvPr id="11" name="Image 10">
+            <a:extLst>
+              <a:ext uri="{FF2B5EF4-FFF2-40B4-BE49-F238E27FC236}">
+                <a16:creationId xmlns:a16="http://schemas.microsoft.com/office/drawing/2014/main" id="{E73BD08F-19A4-4EA0-9A25-8DB43EFB920D}"/>
+              </a:ext>
+            </a:extLst>
+          </p:cNvPr>
+          <p:cNvPicPr>
+            <a:picLocks noChangeAspect="1"/>
+          </p:cNvPicPr>
+          <p:nvPr/>
+        </p:nvPicPr>
+        <p:blipFill>
+          <a:blip r:embed="rId3">
+            <a:clrChange>
+              <a:clrFrom>
+                <a:srgbClr val="FFFFFF"/>
+              </a:clrFrom>
+              <a:clrTo>
+                <a:srgbClr val="FFFFFF">
+                  <a:alpha val="0"/>
+                </a:srgbClr>
+              </a:clrTo>
+            </a:clrChange>
+          </a:blip>
+          <a:stretch>
+            <a:fillRect/>
+          </a:stretch>
+        </p:blipFill>
+        <p:spPr>
+          <a:xfrm flipH="1" flipV="1">
+            <a:off x="7035284" y="3600473"/>
+            <a:ext cx="2892915" cy="2880000"/>
+          </a:xfrm>
+          <a:prstGeom prst="rect">
+            <a:avLst/>
+          </a:prstGeom>
+        </p:spPr>
+      </p:pic>
     </p:spTree>
     <p:extLst>
       <p:ext uri="{BB962C8B-B14F-4D97-AF65-F5344CB8AC3E}">
@@ -3063,6 +3146,209 @@
 </file>
 
 <file path=ppt/slides/slide2.xml><?xml version="1.0" encoding="utf-8"?>
+<p:sld xmlns:a="http://schemas.openxmlformats.org/drawingml/2006/main" xmlns:r="http://schemas.openxmlformats.org/officeDocument/2006/relationships" xmlns:p="http://schemas.openxmlformats.org/presentationml/2006/main">
+  <p:cSld>
+    <p:spTree>
+      <p:nvGrpSpPr>
+        <p:cNvPr id="1" name=""/>
+        <p:cNvGrpSpPr/>
+        <p:nvPr/>
+      </p:nvGrpSpPr>
+      <p:grpSpPr>
+        <a:xfrm>
+          <a:off x="0" y="0"/>
+          <a:ext cx="0" cy="0"/>
+          <a:chOff x="0" y="0"/>
+          <a:chExt cx="0" cy="0"/>
+        </a:xfrm>
+      </p:grpSpPr>
+      <p:pic>
+        <p:nvPicPr>
+          <p:cNvPr id="3" name="Image 2">
+            <a:extLst>
+              <a:ext uri="{FF2B5EF4-FFF2-40B4-BE49-F238E27FC236}">
+                <a16:creationId xmlns:a16="http://schemas.microsoft.com/office/drawing/2014/main" id="{6805F7BD-694E-4064-82BE-134DEE3F049A}"/>
+              </a:ext>
+            </a:extLst>
+          </p:cNvPr>
+          <p:cNvPicPr>
+            <a:picLocks noChangeAspect="1"/>
+          </p:cNvPicPr>
+          <p:nvPr/>
+        </p:nvPicPr>
+        <p:blipFill>
+          <a:blip r:embed="rId2">
+            <a:extLst>
+              <a:ext uri="{28A0092B-C50C-407E-A947-70E740481C1C}">
+                <a14:useLocalDpi xmlns:a14="http://schemas.microsoft.com/office/drawing/2010/main" val="0"/>
+              </a:ext>
+            </a:extLst>
+          </a:blip>
+          <a:stretch>
+            <a:fillRect/>
+          </a:stretch>
+        </p:blipFill>
+        <p:spPr>
+          <a:xfrm>
+            <a:off x="748393" y="355518"/>
+            <a:ext cx="3771900" cy="3771900"/>
+          </a:xfrm>
+          <a:prstGeom prst="rect">
+            <a:avLst/>
+          </a:prstGeom>
+        </p:spPr>
+      </p:pic>
+      <p:pic>
+        <p:nvPicPr>
+          <p:cNvPr id="5" name="Image 4">
+            <a:extLst>
+              <a:ext uri="{FF2B5EF4-FFF2-40B4-BE49-F238E27FC236}">
+                <a16:creationId xmlns:a16="http://schemas.microsoft.com/office/drawing/2014/main" id="{3B9AC385-1502-4623-8199-152295FC4223}"/>
+              </a:ext>
+            </a:extLst>
+          </p:cNvPr>
+          <p:cNvPicPr>
+            <a:picLocks noChangeAspect="1"/>
+          </p:cNvPicPr>
+          <p:nvPr/>
+        </p:nvPicPr>
+        <p:blipFill rotWithShape="1">
+          <a:blip r:embed="rId3">
+            <a:duotone>
+              <a:schemeClr val="accent1">
+                <a:shade val="45000"/>
+                <a:satMod val="135000"/>
+              </a:schemeClr>
+              <a:prstClr val="white"/>
+            </a:duotone>
+          </a:blip>
+          <a:srcRect l="24930" t="22587" r="22886" b="35077"/>
+          <a:stretch/>
+        </p:blipFill>
+        <p:spPr>
+          <a:xfrm>
+            <a:off x="986642" y="1020701"/>
+            <a:ext cx="3295402" cy="2441534"/>
+          </a:xfrm>
+          <a:prstGeom prst="rect">
+            <a:avLst/>
+          </a:prstGeom>
+        </p:spPr>
+      </p:pic>
+      <p:sp>
+        <p:nvSpPr>
+          <p:cNvPr id="6" name="ZoneTexte 5">
+            <a:extLst>
+              <a:ext uri="{FF2B5EF4-FFF2-40B4-BE49-F238E27FC236}">
+                <a16:creationId xmlns:a16="http://schemas.microsoft.com/office/drawing/2014/main" id="{271C18B2-5723-4818-BDAD-5B046EE27C7E}"/>
+              </a:ext>
+            </a:extLst>
+          </p:cNvPr>
+          <p:cNvSpPr txBox="1"/>
+          <p:nvPr/>
+        </p:nvSpPr>
+        <p:spPr>
+          <a:xfrm>
+            <a:off x="944088" y="4655127"/>
+            <a:ext cx="1380506" cy="1569660"/>
+          </a:xfrm>
+          <a:prstGeom prst="rect">
+            <a:avLst/>
+          </a:prstGeom>
+          <a:noFill/>
+        </p:spPr>
+        <p:txBody>
+          <a:bodyPr wrap="none" rtlCol="0">
+            <a:spAutoFit/>
+          </a:bodyPr>
+          <a:lstStyle/>
+          <a:p>
+            <a:r>
+              <a:rPr lang="fr-FR" sz="9600" dirty="0"/>
+              <a:t>Pk</a:t>
+            </a:r>
+          </a:p>
+        </p:txBody>
+      </p:sp>
+      <p:pic>
+        <p:nvPicPr>
+          <p:cNvPr id="8" name="Image 7">
+            <a:extLst>
+              <a:ext uri="{FF2B5EF4-FFF2-40B4-BE49-F238E27FC236}">
+                <a16:creationId xmlns:a16="http://schemas.microsoft.com/office/drawing/2014/main" id="{C316F034-3ED3-4DAD-8047-BBC7988D0CB0}"/>
+              </a:ext>
+            </a:extLst>
+          </p:cNvPr>
+          <p:cNvPicPr>
+            <a:picLocks noChangeAspect="1"/>
+          </p:cNvPicPr>
+          <p:nvPr/>
+        </p:nvPicPr>
+        <p:blipFill>
+          <a:blip r:embed="rId4">
+            <a:extLst>
+              <a:ext uri="{28A0092B-C50C-407E-A947-70E740481C1C}">
+                <a14:useLocalDpi xmlns:a14="http://schemas.microsoft.com/office/drawing/2010/main" val="0"/>
+              </a:ext>
+            </a:extLst>
+          </a:blip>
+          <a:stretch>
+            <a:fillRect/>
+          </a:stretch>
+        </p:blipFill>
+        <p:spPr>
+          <a:xfrm>
+            <a:off x="6496050" y="1258042"/>
+            <a:ext cx="3771900" cy="3771900"/>
+          </a:xfrm>
+          <a:prstGeom prst="rect">
+            <a:avLst/>
+          </a:prstGeom>
+        </p:spPr>
+      </p:pic>
+      <p:pic>
+        <p:nvPicPr>
+          <p:cNvPr id="9" name="Image 8">
+            <a:extLst>
+              <a:ext uri="{FF2B5EF4-FFF2-40B4-BE49-F238E27FC236}">
+                <a16:creationId xmlns:a16="http://schemas.microsoft.com/office/drawing/2014/main" id="{D8CE2220-4F76-419D-B32E-52EA98A1DB1D}"/>
+              </a:ext>
+            </a:extLst>
+          </p:cNvPr>
+          <p:cNvPicPr>
+            <a:picLocks noChangeAspect="1"/>
+          </p:cNvPicPr>
+          <p:nvPr/>
+        </p:nvPicPr>
+        <p:blipFill rotWithShape="1">
+          <a:blip r:embed="rId5"/>
+          <a:srcRect l="27238" t="24668" r="25968" b="37392"/>
+          <a:stretch/>
+        </p:blipFill>
+        <p:spPr>
+          <a:xfrm>
+            <a:off x="6789172" y="1894114"/>
+            <a:ext cx="3185658" cy="2499756"/>
+          </a:xfrm>
+          <a:prstGeom prst="rect">
+            <a:avLst/>
+          </a:prstGeom>
+        </p:spPr>
+      </p:pic>
+    </p:spTree>
+    <p:extLst>
+      <p:ext uri="{BB962C8B-B14F-4D97-AF65-F5344CB8AC3E}">
+        <p14:creationId xmlns:p14="http://schemas.microsoft.com/office/powerpoint/2010/main" val="2015836948"/>
+      </p:ext>
+    </p:extLst>
+  </p:cSld>
+  <p:clrMapOvr>
+    <a:masterClrMapping/>
+  </p:clrMapOvr>
+</p:sld>
+</file>
+
+<file path=ppt/slides/slide3.xml><?xml version="1.0" encoding="utf-8"?>
 <p:sld xmlns:a="http://schemas.openxmlformats.org/drawingml/2006/main" xmlns:r="http://schemas.openxmlformats.org/officeDocument/2006/relationships" xmlns:p="http://schemas.openxmlformats.org/presentationml/2006/main">
   <p:cSld>
     <p:spTree>
@@ -3956,7 +4242,7 @@
 </p:sld>
 </file>
 
-<file path=ppt/slides/slide3.xml><?xml version="1.0" encoding="utf-8"?>
+<file path=ppt/slides/slide4.xml><?xml version="1.0" encoding="utf-8"?>
 <p:sld xmlns:a="http://schemas.openxmlformats.org/drawingml/2006/main" xmlns:r="http://schemas.openxmlformats.org/officeDocument/2006/relationships" xmlns:p="http://schemas.openxmlformats.org/presentationml/2006/main">
   <p:cSld>
     <p:spTree>

</xml_diff>